<commit_message>
update requirements figure with new resolutions
</commit_message>
<xml_diff>
--- a/inputs/charts/IOTC_DataReportingRequirements_rev.pptx
+++ b/inputs/charts/IOTC_DataReportingRequirements_rev.pptx
@@ -272,7 +272,7 @@
           <a:p>
             <a:fld id="{AAD1DACA-C31D-4ADB-98D2-AF54BF822655}" type="datetimeFigureOut">
               <a:rPr lang="en-SC" smtClean="0"/>
-              <a:t>25/11/2021</a:t>
+              <a:t>13/11/2023</a:t>
             </a:fld>
             <a:endParaRPr lang="en-SC"/>
           </a:p>
@@ -472,7 +472,7 @@
           <a:p>
             <a:fld id="{AAD1DACA-C31D-4ADB-98D2-AF54BF822655}" type="datetimeFigureOut">
               <a:rPr lang="en-SC" smtClean="0"/>
-              <a:t>25/11/2021</a:t>
+              <a:t>13/11/2023</a:t>
             </a:fld>
             <a:endParaRPr lang="en-SC"/>
           </a:p>
@@ -682,7 +682,7 @@
           <a:p>
             <a:fld id="{AAD1DACA-C31D-4ADB-98D2-AF54BF822655}" type="datetimeFigureOut">
               <a:rPr lang="en-SC" smtClean="0"/>
-              <a:t>25/11/2021</a:t>
+              <a:t>13/11/2023</a:t>
             </a:fld>
             <a:endParaRPr lang="en-SC"/>
           </a:p>
@@ -882,7 +882,7 @@
           <a:p>
             <a:fld id="{AAD1DACA-C31D-4ADB-98D2-AF54BF822655}" type="datetimeFigureOut">
               <a:rPr lang="en-SC" smtClean="0"/>
-              <a:t>25/11/2021</a:t>
+              <a:t>13/11/2023</a:t>
             </a:fld>
             <a:endParaRPr lang="en-SC"/>
           </a:p>
@@ -1158,7 +1158,7 @@
           <a:p>
             <a:fld id="{AAD1DACA-C31D-4ADB-98D2-AF54BF822655}" type="datetimeFigureOut">
               <a:rPr lang="en-SC" smtClean="0"/>
-              <a:t>25/11/2021</a:t>
+              <a:t>13/11/2023</a:t>
             </a:fld>
             <a:endParaRPr lang="en-SC"/>
           </a:p>
@@ -1426,7 +1426,7 @@
           <a:p>
             <a:fld id="{AAD1DACA-C31D-4ADB-98D2-AF54BF822655}" type="datetimeFigureOut">
               <a:rPr lang="en-SC" smtClean="0"/>
-              <a:t>25/11/2021</a:t>
+              <a:t>13/11/2023</a:t>
             </a:fld>
             <a:endParaRPr lang="en-SC"/>
           </a:p>
@@ -1841,7 +1841,7 @@
           <a:p>
             <a:fld id="{AAD1DACA-C31D-4ADB-98D2-AF54BF822655}" type="datetimeFigureOut">
               <a:rPr lang="en-SC" smtClean="0"/>
-              <a:t>25/11/2021</a:t>
+              <a:t>13/11/2023</a:t>
             </a:fld>
             <a:endParaRPr lang="en-SC"/>
           </a:p>
@@ -1983,7 +1983,7 @@
           <a:p>
             <a:fld id="{AAD1DACA-C31D-4ADB-98D2-AF54BF822655}" type="datetimeFigureOut">
               <a:rPr lang="en-SC" smtClean="0"/>
-              <a:t>25/11/2021</a:t>
+              <a:t>13/11/2023</a:t>
             </a:fld>
             <a:endParaRPr lang="en-SC"/>
           </a:p>
@@ -2096,7 +2096,7 @@
           <a:p>
             <a:fld id="{AAD1DACA-C31D-4ADB-98D2-AF54BF822655}" type="datetimeFigureOut">
               <a:rPr lang="en-SC" smtClean="0"/>
-              <a:t>25/11/2021</a:t>
+              <a:t>13/11/2023</a:t>
             </a:fld>
             <a:endParaRPr lang="en-SC"/>
           </a:p>
@@ -2409,7 +2409,7 @@
           <a:p>
             <a:fld id="{AAD1DACA-C31D-4ADB-98D2-AF54BF822655}" type="datetimeFigureOut">
               <a:rPr lang="en-SC" smtClean="0"/>
-              <a:t>25/11/2021</a:t>
+              <a:t>13/11/2023</a:t>
             </a:fld>
             <a:endParaRPr lang="en-SC"/>
           </a:p>
@@ -2698,7 +2698,7 @@
           <a:p>
             <a:fld id="{AAD1DACA-C31D-4ADB-98D2-AF54BF822655}" type="datetimeFigureOut">
               <a:rPr lang="en-SC" smtClean="0"/>
-              <a:t>25/11/2021</a:t>
+              <a:t>13/11/2023</a:t>
             </a:fld>
             <a:endParaRPr lang="en-SC"/>
           </a:p>
@@ -2941,7 +2941,7 @@
           <a:p>
             <a:fld id="{AAD1DACA-C31D-4ADB-98D2-AF54BF822655}" type="datetimeFigureOut">
               <a:rPr lang="en-SC" smtClean="0"/>
-              <a:t>25/11/2021</a:t>
+              <a:t>13/11/2023</a:t>
             </a:fld>
             <a:endParaRPr lang="en-SC"/>
           </a:p>
@@ -3519,7 +3519,7 @@
                   </a:srgbClr>
                 </a:solidFill>
               </a:rPr>
-              <a:t>13/04</a:t>
+              <a:t>23/06</a:t>
             </a:r>
           </a:p>
         </p:txBody>
@@ -3576,7 +3576,7 @@
                   </a:srgbClr>
                 </a:solidFill>
               </a:rPr>
-              <a:t>12/06</a:t>
+              <a:t>23/07</a:t>
             </a:r>
           </a:p>
         </p:txBody>

</xml_diff>